<commit_message>
Added Course Materials - Jenkins.
</commit_message>
<xml_diff>
--- a/3. Swagger/Day 10/Slides/3. Create OpenAPI Documents with Swagger Editor/create-openapi-documents-with-swagger-editor-slides.pptx
+++ b/3. Swagger/Day 10/Slides/3. Create OpenAPI Documents with Swagger Editor/create-openapi-documents-with-swagger-editor-slides.pptx
@@ -6006,7 +6006,7 @@
         <p:spPr>
           <a:xfrm>
             <a:off x="5226048" y="1017523"/>
-            <a:ext cx="6386195" cy="5548630"/>
+            <a:ext cx="6386195" cy="5600700"/>
           </a:xfrm>
           <a:prstGeom prst="rect">
             <a:avLst/>
@@ -6754,7 +6754,27 @@
                 <a:latin typeface="Verdana" panose="020B0604030504040204"/>
                 <a:cs typeface="Verdana" panose="020B0604030504040204"/>
               </a:rPr>
-              <a:t>Defintions</a:t>
+              <a:t>Defin</a:t>
+            </a:r>
+            <a:r>
+              <a:rPr lang="en-US" sz="2400" spc="-10" dirty="0">
+                <a:solidFill>
+                  <a:srgbClr val="F05A28"/>
+                </a:solidFill>
+                <a:latin typeface="Verdana" panose="020B0604030504040204"/>
+                <a:cs typeface="Verdana" panose="020B0604030504040204"/>
+              </a:rPr>
+              <a:t>i</a:t>
+            </a:r>
+            <a:r>
+              <a:rPr sz="2400" spc="-10" dirty="0">
+                <a:solidFill>
+                  <a:srgbClr val="F05A28"/>
+                </a:solidFill>
+                <a:latin typeface="Verdana" panose="020B0604030504040204"/>
+                <a:cs typeface="Verdana" panose="020B0604030504040204"/>
+              </a:rPr>
+              <a:t>tions</a:t>
             </a:r>
             <a:endParaRPr sz="2400">
               <a:latin typeface="Verdana" panose="020B0604030504040204"/>
@@ -22257,6 +22277,10 @@
           </p:nvPr>
         </p:nvSpPr>
         <p:spPr>
+          <a:xfrm>
+            <a:off x="5466078" y="2022347"/>
+            <a:ext cx="5012055" cy="3474085"/>
+          </a:xfrm>
           <a:prstGeom prst="rect">
             <a:avLst/>
           </a:prstGeom>
@@ -22444,7 +22468,15 @@
             </a:pPr>
             <a:r>
               <a:rPr spc="-30" dirty="0"/>
-              <a:t>paramters</a:t>
+              <a:t>param</a:t>
+            </a:r>
+            <a:r>
+              <a:rPr lang="en-US" spc="-30" dirty="0"/>
+              <a:t>e</a:t>
+            </a:r>
+            <a:r>
+              <a:rPr spc="-30" dirty="0"/>
+              <a:t>ters</a:t>
             </a:r>
             <a:endParaRPr spc="-30" dirty="0"/>
           </a:p>

</xml_diff>